<commit_message>
Added call to help Transcrypt gain mindshare (7)
</commit_message>
<xml_diff>
--- a/transcrypt/docs/images/spread_the_word.pptx
+++ b/transcrypt/docs/images/spread_the_word.pptx
@@ -3139,11 +3139,7 @@
           <a:p>
             <a:r>
               <a:rPr lang="en-US" sz="1600" smtClean="0"/>
-              <a:t>H</a:t>
-            </a:r>
-            <a:r>
-              <a:rPr lang="en-US" sz="1600" smtClean="0"/>
-              <a:t>elp it gain even more mindshare, because that’s what’ll convince companies to rely on it.</a:t>
+              <a:t>Help it gain even more mindshare, because that’s what’ll convince companies to rely on it.</a:t>
             </a:r>
           </a:p>
           <a:p>
@@ -3203,7 +3199,19 @@
           <a:p>
             <a:r>
               <a:rPr lang="en-US" sz="1600" smtClean="0"/>
-              <a:t>- Write about it, use it, let me know what you use it for,</a:t>
+              <a:t>- Write about it, use it, let </a:t>
+            </a:r>
+            <a:r>
+              <a:rPr lang="en-US" sz="1600" smtClean="0"/>
+              <a:t>us</a:t>
+            </a:r>
+            <a:r>
+              <a:rPr lang="en-US" sz="1600" smtClean="0"/>
+              <a:t> </a:t>
+            </a:r>
+            <a:r>
+              <a:rPr lang="en-US" sz="1600" smtClean="0"/>
+              <a:t>know what you use it for,</a:t>
             </a:r>
           </a:p>
           <a:p>

</xml_diff>

<commit_message>
Added call to help Transcrypt gain mindshare (11)
</commit_message>
<xml_diff>
--- a/transcrypt/docs/images/spread_the_word.pptx
+++ b/transcrypt/docs/images/spread_the_word.pptx
@@ -3067,8 +3067,8 @@
         </p:nvSpPr>
         <p:spPr>
           <a:xfrm>
-            <a:off x="683568" y="86916"/>
-            <a:ext cx="7992888" cy="6524863"/>
+            <a:off x="0" y="0"/>
+            <a:ext cx="9144000" cy="6871112"/>
           </a:xfrm>
           <a:prstGeom prst="rect">
             <a:avLst/>
@@ -3094,11 +3094,11 @@
           </a:bodyPr>
           <a:lstStyle/>
           <a:p>
-            <a:endParaRPr lang="en-US" sz="1600" smtClean="0"/>
-          </a:p>
-          <a:p>
-            <a:r>
-              <a:rPr lang="en-US" sz="1600" b="1" smtClean="0">
+            <a:endParaRPr lang="en-US" sz="1050" smtClean="0"/>
+          </a:p>
+          <a:p>
+            <a:r>
+              <a:rPr lang="en-US" b="1" smtClean="0">
                 <a:solidFill>
                   <a:srgbClr val="0070C0"/>
                 </a:solidFill>
@@ -3107,141 +3107,131 @@
             </a:r>
           </a:p>
           <a:p>
+            <a:endParaRPr lang="en-US" smtClean="0"/>
+          </a:p>
+          <a:p>
+            <a:r>
+              <a:rPr lang="en-US" smtClean="0"/>
+              <a:t>Transcrypt has rapidly become a superior alternative to JavaScript.</a:t>
+            </a:r>
+          </a:p>
+          <a:p>
+            <a:r>
+              <a:rPr lang="en-US" smtClean="0"/>
+              <a:t>It enables you to write large, understandable, maintainable web apps in Python 3.5 rightnow.</a:t>
+            </a:r>
+          </a:p>
+          <a:p>
+            <a:r>
+              <a:rPr lang="en-US" smtClean="0"/>
+              <a:t>It brings back the fun in web client programming.</a:t>
+            </a:r>
+          </a:p>
+          <a:p>
+            <a:endParaRPr lang="en-US" smtClean="0"/>
+          </a:p>
+          <a:p>
+            <a:r>
+              <a:rPr lang="en-US" smtClean="0"/>
+              <a:t>Do you agree from your own experience?</a:t>
+            </a:r>
+          </a:p>
+          <a:p>
+            <a:r>
+              <a:rPr lang="en-US" smtClean="0"/>
+              <a:t>Help it gain even more mindshare, because that’s what’ll convince companies to rely on it.</a:t>
+            </a:r>
+          </a:p>
+          <a:p>
+            <a:r>
+              <a:rPr lang="en-US" smtClean="0"/>
+              <a:t>Don’t underestimate your role in this, if each of you brings in three converts,</a:t>
+            </a:r>
+          </a:p>
+          <a:p>
+            <a:r>
+              <a:rPr lang="en-US" smtClean="0"/>
+              <a:t>Transcrypt will have 2000 stars, making it approach Google Closure in popularity.</a:t>
+            </a:r>
+          </a:p>
+          <a:p>
+            <a:endParaRPr lang="en-US" smtClean="0"/>
+          </a:p>
+          <a:p>
+            <a:r>
+              <a:rPr lang="en-US" smtClean="0"/>
+              <a:t>Transcrypt won’t be JavaScript.</a:t>
+            </a:r>
+          </a:p>
+          <a:p>
+            <a:r>
+              <a:rPr lang="en-US" smtClean="0"/>
+              <a:t>It is written for developers who care about the difference.</a:t>
+            </a:r>
+          </a:p>
+          <a:p>
+            <a:r>
+              <a:rPr lang="en-US" smtClean="0"/>
+              <a:t>Are you one of them? Then:</a:t>
+            </a:r>
+          </a:p>
+          <a:p>
+            <a:endParaRPr lang="en-US" smtClean="0"/>
+          </a:p>
+          <a:p>
+            <a:r>
+              <a:rPr lang="en-US" smtClean="0"/>
+              <a:t>- Talk about it to your colleagues</a:t>
+            </a:r>
+          </a:p>
+          <a:p>
+            <a:r>
+              <a:rPr lang="en-US" smtClean="0"/>
+              <a:t>- Invite them to star it on GitHub,</a:t>
+            </a:r>
+          </a:p>
+          <a:p>
+            <a:r>
+              <a:rPr lang="en-US" smtClean="0"/>
+              <a:t>- Make it visible on StackOverflow,</a:t>
+            </a:r>
+          </a:p>
+          <a:p>
+            <a:r>
+              <a:rPr lang="en-US" smtClean="0"/>
+              <a:t>- Write about it, use it, let us know what you use it for,</a:t>
+            </a:r>
+          </a:p>
+          <a:p>
+            <a:r>
+              <a:rPr lang="en-US" smtClean="0"/>
+              <a:t>- Convince your boss what this means for software lifecycle costs,</a:t>
+            </a:r>
+          </a:p>
+          <a:p>
+            <a:r>
+              <a:rPr lang="en-US" smtClean="0"/>
+              <a:t>- Contribute libraries or apps to it on PyPi</a:t>
+            </a:r>
+          </a:p>
+          <a:p>
+            <a:r>
+              <a:rPr lang="en-US" smtClean="0"/>
+              <a:t>- In short co-own it and promote it!</a:t>
+            </a:r>
+          </a:p>
+          <a:p>
             <a:endParaRPr lang="en-US" sz="1600" smtClean="0"/>
           </a:p>
           <a:p>
             <a:r>
-              <a:rPr lang="en-US" sz="1600" smtClean="0"/>
-              <a:t>Transcrypt has rapidly become a superior alternative to JavaScript.</a:t>
-            </a:r>
-          </a:p>
-          <a:p>
-            <a:r>
-              <a:rPr lang="en-US" sz="1600" smtClean="0"/>
-              <a:t>It enables you to write large, understandable, maintainable web apps in Python 3.5 rightnow.</a:t>
-            </a:r>
-          </a:p>
-          <a:p>
-            <a:r>
-              <a:rPr lang="en-US" sz="1600" smtClean="0"/>
-              <a:t>It brings back the fun in web client programming.</a:t>
-            </a:r>
-          </a:p>
-          <a:p>
-            <a:endParaRPr lang="en-US" sz="1600" smtClean="0"/>
-          </a:p>
-          <a:p>
-            <a:r>
-              <a:rPr lang="en-US" sz="1600" smtClean="0"/>
-              <a:t>Do you agree from your own experience?</a:t>
-            </a:r>
-          </a:p>
-          <a:p>
-            <a:r>
-              <a:rPr lang="en-US" sz="1600" smtClean="0"/>
-              <a:t>Help it gain even more mindshare, because that’s what’ll convince companies to rely on it.</a:t>
-            </a:r>
-          </a:p>
-          <a:p>
-            <a:r>
-              <a:rPr lang="en-US" sz="1600" smtClean="0"/>
-              <a:t>Don’t underestimate your role in this, if each of you brings in three converts,</a:t>
-            </a:r>
-          </a:p>
-          <a:p>
-            <a:r>
-              <a:rPr lang="en-US" sz="1600" smtClean="0"/>
-              <a:t>Transcrypt will have 2000 stars, making it approach Google Closure in popularity.</a:t>
-            </a:r>
-          </a:p>
-          <a:p>
-            <a:endParaRPr lang="en-US" sz="1600" smtClean="0"/>
-          </a:p>
-          <a:p>
-            <a:r>
-              <a:rPr lang="en-US" sz="1600" smtClean="0"/>
-              <a:t>Transcrypt won’t be JavaScript.</a:t>
-            </a:r>
-          </a:p>
-          <a:p>
-            <a:r>
-              <a:rPr lang="en-US" sz="1600" smtClean="0"/>
-              <a:t>It is written for developers who care about the difference.</a:t>
-            </a:r>
-          </a:p>
-          <a:p>
-            <a:r>
-              <a:rPr lang="en-US" sz="1600" smtClean="0"/>
-              <a:t>Are you one of them? Then:</a:t>
-            </a:r>
-          </a:p>
-          <a:p>
-            <a:endParaRPr lang="en-US" sz="1600" smtClean="0"/>
-          </a:p>
-          <a:p>
-            <a:r>
-              <a:rPr lang="en-US" sz="1600" smtClean="0"/>
-              <a:t>- Talk about it to your colleagues</a:t>
-            </a:r>
-          </a:p>
-          <a:p>
-            <a:r>
-              <a:rPr lang="en-US" sz="1600" smtClean="0"/>
-              <a:t>- Invite them to star it on GitHub,</a:t>
-            </a:r>
-          </a:p>
-          <a:p>
-            <a:r>
-              <a:rPr lang="en-US" sz="1600" smtClean="0"/>
-              <a:t>- Make it visible on StackOverflow,</a:t>
-            </a:r>
-          </a:p>
-          <a:p>
-            <a:r>
-              <a:rPr lang="en-US" sz="1600" smtClean="0"/>
-              <a:t>- Write about it, use it, let </a:t>
-            </a:r>
-            <a:r>
-              <a:rPr lang="en-US" sz="1600" smtClean="0"/>
-              <a:t>us</a:t>
-            </a:r>
-            <a:r>
-              <a:rPr lang="en-US" sz="1600" smtClean="0"/>
-              <a:t> </a:t>
-            </a:r>
-            <a:r>
-              <a:rPr lang="en-US" sz="1600" smtClean="0"/>
-              <a:t>know what you use it for,</a:t>
-            </a:r>
-          </a:p>
-          <a:p>
-            <a:r>
-              <a:rPr lang="en-US" sz="1600" smtClean="0"/>
-              <a:t>- Convince your boss what this means for software lifecycle costs,</a:t>
-            </a:r>
-          </a:p>
-          <a:p>
-            <a:r>
-              <a:rPr lang="en-US" sz="1600" smtClean="0"/>
-              <a:t>- Contribute libraries or apps to it on PyPi</a:t>
-            </a:r>
-          </a:p>
-          <a:p>
-            <a:r>
-              <a:rPr lang="en-US" sz="1600" smtClean="0"/>
-              <a:t>- In short co-own it and promote it!</a:t>
-            </a:r>
-          </a:p>
-          <a:p>
-            <a:endParaRPr lang="en-US" sz="1600" smtClean="0"/>
-          </a:p>
-          <a:p>
-            <a:r>
-              <a:rPr lang="en-US" sz="1600" smtClean="0"/>
-              <a:t>Jacques de Hooge</a:t>
-            </a:r>
-          </a:p>
-          <a:p>
+              <a:rPr lang="en-US" smtClean="0"/>
+              <a:t>Jacques de </a:t>
+            </a:r>
+            <a:r>
+              <a:rPr lang="en-US" smtClean="0"/>
+              <a:t>Hooge</a:t>
+            </a:r>
             <a:endParaRPr lang="en-US" smtClean="0"/>
           </a:p>
         </p:txBody>

</xml_diff>